<commit_message>
fix showing of columns
</commit_message>
<xml_diff>
--- a/docs/Architecture.pptx
+++ b/docs/Architecture.pptx
@@ -192,7 +192,7 @@
           <a:p>
             <a:fld id="{12C73BD1-E919-4514-A897-6086B61B6A01}" type="datetimeFigureOut">
               <a:rPr lang="en-CA" smtClean="0"/>
-              <a:t>2015-02-18</a:t>
+              <a:t>2015-03-16</a:t>
             </a:fld>
             <a:endParaRPr lang="en-CA"/>
           </a:p>
@@ -725,7 +725,7 @@
           <a:p>
             <a:fld id="{57E13E19-9712-4C08-A35C-78B78B9B3BC2}" type="datetimeFigureOut">
               <a:rPr lang="en-CA" smtClean="0"/>
-              <a:t>2015-02-18</a:t>
+              <a:t>2015-03-16</a:t>
             </a:fld>
             <a:endParaRPr lang="en-CA"/>
           </a:p>
@@ -895,7 +895,7 @@
           <a:p>
             <a:fld id="{57E13E19-9712-4C08-A35C-78B78B9B3BC2}" type="datetimeFigureOut">
               <a:rPr lang="en-CA" smtClean="0"/>
-              <a:t>2015-02-18</a:t>
+              <a:t>2015-03-16</a:t>
             </a:fld>
             <a:endParaRPr lang="en-CA"/>
           </a:p>
@@ -1075,7 +1075,7 @@
           <a:p>
             <a:fld id="{57E13E19-9712-4C08-A35C-78B78B9B3BC2}" type="datetimeFigureOut">
               <a:rPr lang="en-CA" smtClean="0"/>
-              <a:t>2015-02-18</a:t>
+              <a:t>2015-03-16</a:t>
             </a:fld>
             <a:endParaRPr lang="en-CA"/>
           </a:p>
@@ -1245,7 +1245,7 @@
           <a:p>
             <a:fld id="{57E13E19-9712-4C08-A35C-78B78B9B3BC2}" type="datetimeFigureOut">
               <a:rPr lang="en-CA" smtClean="0"/>
-              <a:t>2015-02-18</a:t>
+              <a:t>2015-03-16</a:t>
             </a:fld>
             <a:endParaRPr lang="en-CA"/>
           </a:p>
@@ -1491,7 +1491,7 @@
           <a:p>
             <a:fld id="{57E13E19-9712-4C08-A35C-78B78B9B3BC2}" type="datetimeFigureOut">
               <a:rPr lang="en-CA" smtClean="0"/>
-              <a:t>2015-02-18</a:t>
+              <a:t>2015-03-16</a:t>
             </a:fld>
             <a:endParaRPr lang="en-CA"/>
           </a:p>
@@ -1779,7 +1779,7 @@
           <a:p>
             <a:fld id="{57E13E19-9712-4C08-A35C-78B78B9B3BC2}" type="datetimeFigureOut">
               <a:rPr lang="en-CA" smtClean="0"/>
-              <a:t>2015-02-18</a:t>
+              <a:t>2015-03-16</a:t>
             </a:fld>
             <a:endParaRPr lang="en-CA"/>
           </a:p>
@@ -2201,7 +2201,7 @@
           <a:p>
             <a:fld id="{57E13E19-9712-4C08-A35C-78B78B9B3BC2}" type="datetimeFigureOut">
               <a:rPr lang="en-CA" smtClean="0"/>
-              <a:t>2015-02-18</a:t>
+              <a:t>2015-03-16</a:t>
             </a:fld>
             <a:endParaRPr lang="en-CA"/>
           </a:p>
@@ -2319,7 +2319,7 @@
           <a:p>
             <a:fld id="{57E13E19-9712-4C08-A35C-78B78B9B3BC2}" type="datetimeFigureOut">
               <a:rPr lang="en-CA" smtClean="0"/>
-              <a:t>2015-02-18</a:t>
+              <a:t>2015-03-16</a:t>
             </a:fld>
             <a:endParaRPr lang="en-CA"/>
           </a:p>
@@ -2414,7 +2414,7 @@
           <a:p>
             <a:fld id="{57E13E19-9712-4C08-A35C-78B78B9B3BC2}" type="datetimeFigureOut">
               <a:rPr lang="en-CA" smtClean="0"/>
-              <a:t>2015-02-18</a:t>
+              <a:t>2015-03-16</a:t>
             </a:fld>
             <a:endParaRPr lang="en-CA"/>
           </a:p>
@@ -2691,7 +2691,7 @@
           <a:p>
             <a:fld id="{57E13E19-9712-4C08-A35C-78B78B9B3BC2}" type="datetimeFigureOut">
               <a:rPr lang="en-CA" smtClean="0"/>
-              <a:t>2015-02-18</a:t>
+              <a:t>2015-03-16</a:t>
             </a:fld>
             <a:endParaRPr lang="en-CA"/>
           </a:p>
@@ -2944,7 +2944,7 @@
           <a:p>
             <a:fld id="{57E13E19-9712-4C08-A35C-78B78B9B3BC2}" type="datetimeFigureOut">
               <a:rPr lang="en-CA" smtClean="0"/>
-              <a:t>2015-02-18</a:t>
+              <a:t>2015-03-16</a:t>
             </a:fld>
             <a:endParaRPr lang="en-CA"/>
           </a:p>
@@ -3157,7 +3157,7 @@
           <a:p>
             <a:fld id="{57E13E19-9712-4C08-A35C-78B78B9B3BC2}" type="datetimeFigureOut">
               <a:rPr lang="en-CA" smtClean="0"/>
-              <a:t>2015-02-18</a:t>
+              <a:t>2015-03-16</a:t>
             </a:fld>
             <a:endParaRPr lang="en-CA"/>
           </a:p>
@@ -3543,7 +3543,7 @@
         <p:spPr>
           <a:xfrm>
             <a:off x="271719" y="1015292"/>
-            <a:ext cx="6748553" cy="4573947"/>
+            <a:ext cx="6850561" cy="5100383"/>
           </a:xfrm>
           <a:prstGeom prst="roundRect">
             <a:avLst>
@@ -3593,6 +3593,154 @@
           </a:p>
         </p:txBody>
       </p:sp>
+      <p:sp>
+        <p:nvSpPr>
+          <p:cNvPr id="106" name="Rounded Rectangle 105">
+            <a:hlinkClick r:id="rId4"/>
+          </p:cNvPr>
+          <p:cNvSpPr/>
+          <p:nvPr/>
+        </p:nvSpPr>
+        <p:spPr>
+          <a:xfrm>
+            <a:off x="433795" y="5092950"/>
+            <a:ext cx="1080050" cy="723480"/>
+          </a:xfrm>
+          <a:prstGeom prst="roundRect">
+            <a:avLst>
+              <a:gd name="adj" fmla="val 0"/>
+            </a:avLst>
+          </a:prstGeom>
+          <a:solidFill>
+            <a:srgbClr val="FCFCFC"/>
+          </a:solidFill>
+          <a:ln>
+            <a:solidFill>
+              <a:schemeClr val="accent1">
+                <a:lumMod val="75000"/>
+              </a:schemeClr>
+            </a:solidFill>
+            <a:round/>
+          </a:ln>
+          <a:effectLst>
+            <a:outerShdw blurRad="127000" dist="50800" dir="2640000" algn="ctr" rotWithShape="0">
+              <a:srgbClr val="000000">
+                <a:alpha val="34000"/>
+              </a:srgbClr>
+            </a:outerShdw>
+          </a:effectLst>
+        </p:spPr>
+        <p:style>
+          <a:lnRef idx="2">
+            <a:schemeClr val="accent1">
+              <a:shade val="50000"/>
+            </a:schemeClr>
+          </a:lnRef>
+          <a:fillRef idx="1">
+            <a:schemeClr val="accent1"/>
+          </a:fillRef>
+          <a:effectRef idx="0">
+            <a:schemeClr val="accent1"/>
+          </a:effectRef>
+          <a:fontRef idx="minor">
+            <a:schemeClr val="lt1"/>
+          </a:fontRef>
+        </p:style>
+        <p:txBody>
+          <a:bodyPr rtlCol="0" anchor="b" anchorCtr="0"/>
+          <a:lstStyle/>
+          <a:p>
+            <a:pPr algn="ctr"/>
+            <a:r>
+              <a:rPr lang="en-CA" sz="1200" b="1" dirty="0" smtClean="0">
+                <a:solidFill>
+                  <a:schemeClr val="tx1"/>
+                </a:solidFill>
+              </a:rPr>
+              <a:t>t2.small</a:t>
+            </a:r>
+            <a:endParaRPr lang="en-CA" sz="1200" b="1" dirty="0" smtClean="0">
+              <a:solidFill>
+                <a:schemeClr val="tx1"/>
+              </a:solidFill>
+            </a:endParaRPr>
+          </a:p>
+        </p:txBody>
+      </p:sp>
+      <p:sp>
+        <p:nvSpPr>
+          <p:cNvPr id="67" name="Rounded Rectangle 66">
+            <a:hlinkClick r:id="rId4"/>
+          </p:cNvPr>
+          <p:cNvSpPr/>
+          <p:nvPr/>
+        </p:nvSpPr>
+        <p:spPr>
+          <a:xfrm>
+            <a:off x="5904148" y="1484783"/>
+            <a:ext cx="1080050" cy="1326767"/>
+          </a:xfrm>
+          <a:prstGeom prst="roundRect">
+            <a:avLst>
+              <a:gd name="adj" fmla="val 0"/>
+            </a:avLst>
+          </a:prstGeom>
+          <a:solidFill>
+            <a:srgbClr val="FCFCFC"/>
+          </a:solidFill>
+          <a:ln>
+            <a:solidFill>
+              <a:schemeClr val="accent1">
+                <a:lumMod val="75000"/>
+              </a:schemeClr>
+            </a:solidFill>
+            <a:round/>
+          </a:ln>
+          <a:effectLst>
+            <a:outerShdw blurRad="127000" dist="50800" dir="2640000" algn="ctr" rotWithShape="0">
+              <a:srgbClr val="000000">
+                <a:alpha val="34000"/>
+              </a:srgbClr>
+            </a:outerShdw>
+          </a:effectLst>
+        </p:spPr>
+        <p:style>
+          <a:lnRef idx="2">
+            <a:schemeClr val="accent1">
+              <a:shade val="50000"/>
+            </a:schemeClr>
+          </a:lnRef>
+          <a:fillRef idx="1">
+            <a:schemeClr val="accent1"/>
+          </a:fillRef>
+          <a:effectRef idx="0">
+            <a:schemeClr val="accent1"/>
+          </a:effectRef>
+          <a:fontRef idx="minor">
+            <a:schemeClr val="lt1"/>
+          </a:fontRef>
+        </p:style>
+        <p:txBody>
+          <a:bodyPr rtlCol="0" anchor="b" anchorCtr="0"/>
+          <a:lstStyle/>
+          <a:p>
+            <a:pPr algn="ctr"/>
+            <a:r>
+              <a:rPr lang="en-CA" sz="1200" b="1" dirty="0" smtClean="0">
+                <a:solidFill>
+                  <a:schemeClr val="tx1"/>
+                </a:solidFill>
+              </a:rPr>
+              <a:t>(t2.medium)</a:t>
+            </a:r>
+            <a:endParaRPr lang="en-CA" sz="1200" b="1" dirty="0" smtClean="0">
+              <a:solidFill>
+                <a:schemeClr val="tx1"/>
+              </a:solidFill>
+            </a:endParaRPr>
+          </a:p>
+        </p:txBody>
+      </p:sp>
       <p:grpSp>
         <p:nvGrpSpPr>
           <p:cNvPr id="135" name="Group 134"/>
@@ -3616,7 +3764,7 @@
             <p:nvPr/>
           </p:nvPicPr>
           <p:blipFill>
-            <a:blip r:embed="rId4">
+            <a:blip r:embed="rId5">
               <a:extLst>
                 <a:ext uri="{28A0092B-C50C-407E-A947-70E740481C1C}">
                   <a14:useLocalDpi xmlns:a14="http://schemas.microsoft.com/office/drawing/2010/main" val="0"/>
@@ -3701,7 +3849,7 @@
       <p:sp>
         <p:nvSpPr>
           <p:cNvPr id="52" name="Rounded Rectangle 51">
-            <a:hlinkClick r:id="rId5"/>
+            <a:hlinkClick r:id="rId4"/>
           </p:cNvPr>
           <p:cNvSpPr/>
           <p:nvPr/>
@@ -3757,14 +3905,14 @@
       <p:sp>
         <p:nvSpPr>
           <p:cNvPr id="51" name="Rounded Rectangle 50">
-            <a:hlinkClick r:id="rId5"/>
+            <a:hlinkClick r:id="rId4"/>
           </p:cNvPr>
           <p:cNvSpPr/>
           <p:nvPr/>
         </p:nvSpPr>
         <p:spPr>
           <a:xfrm>
-            <a:off x="4096168" y="1223048"/>
+            <a:off x="4096167" y="1223047"/>
             <a:ext cx="1377143" cy="1519129"/>
           </a:xfrm>
           <a:prstGeom prst="roundRect">
@@ -3812,16 +3960,16 @@
       </p:sp>
       <p:sp>
         <p:nvSpPr>
-          <p:cNvPr id="47" name="Rounded Rectangle 46">
-            <a:hlinkClick r:id="rId5"/>
+          <p:cNvPr id="46" name="Rounded Rectangle 45">
+            <a:hlinkClick r:id="rId4"/>
           </p:cNvPr>
           <p:cNvSpPr/>
           <p:nvPr/>
         </p:nvSpPr>
         <p:spPr>
           <a:xfrm>
-            <a:off x="1742783" y="1164975"/>
-            <a:ext cx="1397633" cy="1519129"/>
+            <a:off x="1661328" y="1226606"/>
+            <a:ext cx="1407080" cy="1519129"/>
           </a:xfrm>
           <a:prstGeom prst="roundRect">
             <a:avLst>
@@ -3878,16 +4026,16 @@
       </p:sp>
       <p:sp>
         <p:nvSpPr>
-          <p:cNvPr id="46" name="Rounded Rectangle 45">
-            <a:hlinkClick r:id="rId5"/>
+          <p:cNvPr id="126" name="Rounded Rectangle 125">
+            <a:hlinkClick r:id="rId4"/>
           </p:cNvPr>
           <p:cNvSpPr/>
           <p:nvPr/>
         </p:nvSpPr>
         <p:spPr>
           <a:xfrm>
-            <a:off x="1661328" y="1226606"/>
-            <a:ext cx="1407080" cy="1519129"/>
+            <a:off x="1589362" y="1292421"/>
+            <a:ext cx="1407038" cy="1519129"/>
           </a:xfrm>
           <a:prstGeom prst="roundRect">
             <a:avLst>
@@ -3934,6 +4082,30 @@
           <a:lstStyle/>
           <a:p>
             <a:pPr algn="ctr"/>
+            <a:r>
+              <a:rPr lang="en-CA" sz="1200" b="1" dirty="0" smtClean="0">
+                <a:solidFill>
+                  <a:schemeClr val="tx1"/>
+                </a:solidFill>
+              </a:rPr>
+              <a:t>ETL </a:t>
+            </a:r>
+            <a:r>
+              <a:rPr lang="en-CA" sz="1200" b="1" dirty="0">
+                <a:solidFill>
+                  <a:schemeClr val="tx1"/>
+                </a:solidFill>
+              </a:rPr>
+              <a:t>(</a:t>
+            </a:r>
+            <a:r>
+              <a:rPr lang="en-CA" sz="1200" b="1" dirty="0" smtClean="0">
+                <a:solidFill>
+                  <a:schemeClr val="tx1"/>
+                </a:solidFill>
+              </a:rPr>
+              <a:t>c4.4xlarge)</a:t>
+            </a:r>
             <a:endParaRPr lang="en-CA" sz="1200" b="1" dirty="0" smtClean="0">
               <a:solidFill>
                 <a:schemeClr val="tx1"/>
@@ -3944,77 +4116,8 @@
       </p:sp>
       <p:sp>
         <p:nvSpPr>
-          <p:cNvPr id="126" name="Rounded Rectangle 125">
-            <a:hlinkClick r:id="rId5"/>
-          </p:cNvPr>
-          <p:cNvSpPr/>
-          <p:nvPr/>
-        </p:nvSpPr>
-        <p:spPr>
-          <a:xfrm>
-            <a:off x="1589362" y="1292421"/>
-            <a:ext cx="1407038" cy="1519129"/>
-          </a:xfrm>
-          <a:prstGeom prst="roundRect">
-            <a:avLst>
-              <a:gd name="adj" fmla="val 0"/>
-            </a:avLst>
-          </a:prstGeom>
-          <a:solidFill>
-            <a:srgbClr val="FCFCFC"/>
-          </a:solidFill>
-          <a:ln>
-            <a:solidFill>
-              <a:schemeClr val="accent1">
-                <a:lumMod val="75000"/>
-              </a:schemeClr>
-            </a:solidFill>
-            <a:round/>
-          </a:ln>
-          <a:effectLst>
-            <a:outerShdw blurRad="127000" dist="50800" dir="2640000" algn="ctr" rotWithShape="0">
-              <a:srgbClr val="000000">
-                <a:alpha val="34000"/>
-              </a:srgbClr>
-            </a:outerShdw>
-          </a:effectLst>
-        </p:spPr>
-        <p:style>
-          <a:lnRef idx="2">
-            <a:schemeClr val="accent1">
-              <a:shade val="50000"/>
-            </a:schemeClr>
-          </a:lnRef>
-          <a:fillRef idx="1">
-            <a:schemeClr val="accent1"/>
-          </a:fillRef>
-          <a:effectRef idx="0">
-            <a:schemeClr val="accent1"/>
-          </a:effectRef>
-          <a:fontRef idx="minor">
-            <a:schemeClr val="lt1"/>
-          </a:fontRef>
-        </p:style>
-        <p:txBody>
-          <a:bodyPr rtlCol="0" anchor="t" anchorCtr="0"/>
-          <a:lstStyle/>
-          <a:p>
-            <a:pPr algn="ctr"/>
-            <a:r>
-              <a:rPr lang="en-CA" sz="1200" b="1" dirty="0" smtClean="0">
-                <a:solidFill>
-                  <a:schemeClr val="tx1"/>
-                </a:solidFill>
-              </a:rPr>
-              <a:t>ETL Machines</a:t>
-            </a:r>
-          </a:p>
-        </p:txBody>
-      </p:sp>
-      <p:sp>
-        <p:nvSpPr>
           <p:cNvPr id="84" name="Rounded Rectangle 83">
-            <a:hlinkClick r:id="rId5"/>
+            <a:hlinkClick r:id="rId4"/>
           </p:cNvPr>
           <p:cNvSpPr/>
           <p:nvPr/>
@@ -4073,7 +4176,23 @@
                   <a:schemeClr val="tx1"/>
                 </a:solidFill>
               </a:rPr>
-              <a:t> Machines</a:t>
+              <a:t> </a:t>
+            </a:r>
+            <a:r>
+              <a:rPr lang="en-CA" sz="1200" b="1" dirty="0">
+                <a:solidFill>
+                  <a:schemeClr val="tx1"/>
+                </a:solidFill>
+              </a:rPr>
+              <a:t>(</a:t>
+            </a:r>
+            <a:r>
+              <a:rPr lang="en-CA" sz="1200" b="1" dirty="0" smtClean="0">
+                <a:solidFill>
+                  <a:schemeClr val="tx1"/>
+                </a:solidFill>
+              </a:rPr>
+              <a:t>r3.xlarge)</a:t>
             </a:r>
             <a:endParaRPr lang="en-CA" sz="1200" b="1" dirty="0" smtClean="0">
               <a:solidFill>
@@ -4198,8 +4317,8 @@
         </p:nvSpPr>
         <p:spPr>
           <a:xfrm>
-            <a:off x="6164752" y="1299262"/>
-            <a:ext cx="665621" cy="1498337"/>
+            <a:off x="6111362" y="1674173"/>
+            <a:ext cx="665621" cy="746019"/>
           </a:xfrm>
           <a:prstGeom prst="roundRect">
             <a:avLst/>
@@ -4299,7 +4418,7 @@
         </p:nvSpPr>
         <p:spPr>
           <a:xfrm>
-            <a:off x="1006912" y="5772626"/>
+            <a:off x="4666210" y="4923021"/>
             <a:ext cx="2352134" cy="600164"/>
           </a:xfrm>
           <a:prstGeom prst="rect">
@@ -4406,36 +4525,6 @@
           </a:p>
         </p:txBody>
       </p:sp>
-      <p:pic>
-        <p:nvPicPr>
-          <p:cNvPr id="42" name="Picture 41"/>
-          <p:cNvPicPr>
-            <a:picLocks noChangeAspect="1"/>
-          </p:cNvPicPr>
-          <p:nvPr/>
-        </p:nvPicPr>
-        <p:blipFill>
-          <a:blip r:embed="rId8" cstate="print">
-            <a:extLst>
-              <a:ext uri="{28A0092B-C50C-407E-A947-70E740481C1C}">
-                <a14:useLocalDpi xmlns:a14="http://schemas.microsoft.com/office/drawing/2010/main" val="0"/>
-              </a:ext>
-            </a:extLst>
-          </a:blip>
-          <a:stretch>
-            <a:fillRect/>
-          </a:stretch>
-        </p:blipFill>
-        <p:spPr>
-          <a:xfrm>
-            <a:off x="7537974" y="1855490"/>
-            <a:ext cx="1311374" cy="1185696"/>
-          </a:xfrm>
-          <a:prstGeom prst="rect">
-            <a:avLst/>
-          </a:prstGeom>
-        </p:spPr>
-      </p:pic>
       <p:cxnSp>
         <p:nvCxnSpPr>
           <p:cNvPr id="53" name="Elbow Connector 52"/>
@@ -4446,8 +4535,8 @@
         </p:nvCxnSpPr>
         <p:spPr>
           <a:xfrm rot="10800000">
-            <a:off x="248020" y="5332517"/>
-            <a:ext cx="238994" cy="1"/>
+            <a:off x="271719" y="5357297"/>
+            <a:ext cx="303838" cy="1"/>
           </a:xfrm>
           <a:prstGeom prst="bentConnector3">
             <a:avLst>
@@ -4484,10 +4573,10 @@
         </p:nvGrpSpPr>
         <p:grpSpPr>
           <a:xfrm>
-            <a:off x="2787950" y="3542691"/>
-            <a:ext cx="999734" cy="1367562"/>
+            <a:off x="2787955" y="3542691"/>
+            <a:ext cx="999735" cy="1454375"/>
             <a:chOff x="7682389" y="870322"/>
-            <a:chExt cx="1238982" cy="1684280"/>
+            <a:chExt cx="1238982" cy="1791198"/>
           </a:xfrm>
         </p:grpSpPr>
         <p:pic>
@@ -4499,7 +4588,7 @@
             <p:nvPr/>
           </p:nvPicPr>
           <p:blipFill>
-            <a:blip r:embed="rId9" cstate="print">
+            <a:blip r:embed="rId8" cstate="print">
               <a:extLst>
                 <a:ext uri="{28A0092B-C50C-407E-A947-70E740481C1C}">
                   <a14:useLocalDpi xmlns:a14="http://schemas.microsoft.com/office/drawing/2010/main" val="0"/>
@@ -4528,8 +4617,8 @@
           </p:nvSpPr>
           <p:spPr>
             <a:xfrm>
-              <a:off x="7813348" y="2092937"/>
-              <a:ext cx="1016497" cy="461665"/>
+              <a:off x="7745040" y="2092937"/>
+              <a:ext cx="1153114" cy="568583"/>
             </a:xfrm>
             <a:prstGeom prst="rect">
               <a:avLst/>
@@ -4552,8 +4641,9 @@
               <a:pPr algn="ctr"/>
               <a:r>
                 <a:rPr lang="en-CA" sz="1200" b="1" dirty="0" smtClean="0"/>
-                <a:t>Intermediate</a:t>
+                <a:t>Test Results</a:t>
               </a:r>
+              <a:endParaRPr lang="en-CA" sz="1200" b="1" dirty="0" smtClean="0"/>
             </a:p>
           </p:txBody>
         </p:sp>
@@ -4581,7 +4671,7 @@
             <p:nvPr/>
           </p:nvPicPr>
           <p:blipFill>
-            <a:blip r:embed="rId10" cstate="print">
+            <a:blip r:embed="rId9" cstate="print">
               <a:extLst>
                 <a:ext uri="{28A0092B-C50C-407E-A947-70E740481C1C}">
                   <a14:useLocalDpi xmlns:a14="http://schemas.microsoft.com/office/drawing/2010/main" val="0"/>
@@ -4657,8 +4747,8 @@
         </p:nvSpPr>
         <p:spPr>
           <a:xfrm>
-            <a:off x="487014" y="5165129"/>
-            <a:ext cx="936105" cy="334776"/>
+            <a:off x="575557" y="5161357"/>
+            <a:ext cx="756084" cy="391879"/>
           </a:xfrm>
           <a:prstGeom prst="roundRect">
             <a:avLst/>
@@ -4814,7 +4904,7 @@
                   <a:schemeClr val="tx1"/>
                 </a:solidFill>
               </a:rPr>
-              <a:t>Backup</a:t>
+              <a:t>ETL</a:t>
             </a:r>
             <a:endParaRPr lang="en-CA" sz="1200" b="1" dirty="0">
               <a:solidFill>
@@ -4835,12 +4925,12 @@
         </p:nvCxnSpPr>
         <p:spPr>
           <a:xfrm rot="10800000" flipH="1" flipV="1">
-            <a:off x="349622" y="3493469"/>
-            <a:ext cx="137391" cy="1839048"/>
+            <a:off x="349623" y="3493469"/>
+            <a:ext cx="225934" cy="1863828"/>
           </a:xfrm>
           <a:prstGeom prst="bentConnector3">
             <a:avLst>
-              <a:gd name="adj1" fmla="val -166386"/>
+              <a:gd name="adj1" fmla="val -101180"/>
             </a:avLst>
           </a:prstGeom>
           <a:ln w="31750">
@@ -5134,7 +5224,7 @@
                   <a:schemeClr val="tx1"/>
                 </a:solidFill>
               </a:rPr>
-              <a:t>ETL</a:t>
+              <a:t>Copy</a:t>
             </a:r>
             <a:endParaRPr lang="en-CA" sz="1200" b="1" dirty="0">
               <a:solidFill>
@@ -5154,9 +5244,9 @@
           <p:nvPr/>
         </p:nvCxnSpPr>
         <p:spPr>
-          <a:xfrm>
-            <a:off x="5415707" y="2048430"/>
-            <a:ext cx="749045" cy="1"/>
+          <a:xfrm flipV="1">
+            <a:off x="5415707" y="2047183"/>
+            <a:ext cx="695655" cy="1247"/>
           </a:xfrm>
           <a:prstGeom prst="bentConnector3">
             <a:avLst>
@@ -5195,9 +5285,9 @@
           <p:nvPr/>
         </p:nvCxnSpPr>
         <p:spPr>
-          <a:xfrm>
-            <a:off x="6830373" y="2048431"/>
-            <a:ext cx="707601" cy="399907"/>
+          <a:xfrm flipV="1">
+            <a:off x="6776983" y="2047182"/>
+            <a:ext cx="756081" cy="1"/>
           </a:xfrm>
           <a:prstGeom prst="bentConnector3">
             <a:avLst>
@@ -5288,7 +5378,7 @@
             <p:nvPr/>
           </p:nvPicPr>
           <p:blipFill>
-            <a:blip r:embed="rId9" cstate="print">
+            <a:blip r:embed="rId8" cstate="print">
               <a:extLst>
                 <a:ext uri="{28A0092B-C50C-407E-A947-70E740481C1C}">
                   <a14:useLocalDpi xmlns:a14="http://schemas.microsoft.com/office/drawing/2010/main" val="0"/>
@@ -5429,35 +5519,80 @@
           </a:fontRef>
         </p:style>
       </p:cxnSp>
-      <p:sp>
-        <p:nvSpPr>
-          <p:cNvPr id="150" name="TextBox 149"/>
-          <p:cNvSpPr txBox="1"/>
+      <p:grpSp>
+        <p:nvGrpSpPr>
+          <p:cNvPr id="69" name="Group 68"/>
+          <p:cNvGrpSpPr/>
           <p:nvPr/>
-        </p:nvSpPr>
-        <p:spPr>
+        </p:nvGrpSpPr>
+        <p:grpSpPr>
           <a:xfrm>
-            <a:off x="7721127" y="2276532"/>
-            <a:ext cx="945067" cy="369332"/>
-          </a:xfrm>
-          <a:prstGeom prst="rect">
-            <a:avLst/>
-          </a:prstGeom>
-          <a:noFill/>
-        </p:spPr>
-        <p:txBody>
-          <a:bodyPr wrap="none" rtlCol="0">
-            <a:spAutoFit/>
-          </a:bodyPr>
-          <a:lstStyle/>
-          <a:p>
-            <a:r>
-              <a:rPr lang="en-CA" dirty="0" smtClean="0"/>
-              <a:t>Internet</a:t>
-            </a:r>
-          </a:p>
-        </p:txBody>
-      </p:sp>
+            <a:off x="7533064" y="1454334"/>
+            <a:ext cx="1311374" cy="1185696"/>
+            <a:chOff x="7537974" y="1855490"/>
+            <a:chExt cx="1311374" cy="1185696"/>
+          </a:xfrm>
+        </p:grpSpPr>
+        <p:pic>
+          <p:nvPicPr>
+            <p:cNvPr id="42" name="Picture 41"/>
+            <p:cNvPicPr>
+              <a:picLocks noChangeAspect="1"/>
+            </p:cNvPicPr>
+            <p:nvPr/>
+          </p:nvPicPr>
+          <p:blipFill>
+            <a:blip r:embed="rId10" cstate="print">
+              <a:extLst>
+                <a:ext uri="{28A0092B-C50C-407E-A947-70E740481C1C}">
+                  <a14:useLocalDpi xmlns:a14="http://schemas.microsoft.com/office/drawing/2010/main" val="0"/>
+                </a:ext>
+              </a:extLst>
+            </a:blip>
+            <a:stretch>
+              <a:fillRect/>
+            </a:stretch>
+          </p:blipFill>
+          <p:spPr>
+            <a:xfrm>
+              <a:off x="7537974" y="1855490"/>
+              <a:ext cx="1311374" cy="1185696"/>
+            </a:xfrm>
+            <a:prstGeom prst="rect">
+              <a:avLst/>
+            </a:prstGeom>
+          </p:spPr>
+        </p:pic>
+        <p:sp>
+          <p:nvSpPr>
+            <p:cNvPr id="150" name="TextBox 149"/>
+            <p:cNvSpPr txBox="1"/>
+            <p:nvPr/>
+          </p:nvSpPr>
+          <p:spPr>
+            <a:xfrm>
+              <a:off x="7721127" y="2276532"/>
+              <a:ext cx="945067" cy="369332"/>
+            </a:xfrm>
+            <a:prstGeom prst="rect">
+              <a:avLst/>
+            </a:prstGeom>
+            <a:noFill/>
+          </p:spPr>
+          <p:txBody>
+            <a:bodyPr wrap="none" rtlCol="0">
+              <a:spAutoFit/>
+            </a:bodyPr>
+            <a:lstStyle/>
+            <a:p>
+              <a:r>
+                <a:rPr lang="en-CA" dirty="0" smtClean="0"/>
+                <a:t>Internet</a:t>
+              </a:r>
+            </a:p>
+          </p:txBody>
+        </p:sp>
+      </p:grpSp>
       <p:cxnSp>
         <p:nvCxnSpPr>
           <p:cNvPr id="265" name="Elbow Connector 264"/>
@@ -5548,8 +5683,8 @@
         </p:nvCxnSpPr>
         <p:spPr>
           <a:xfrm rot="16200000" flipH="1">
-            <a:off x="6676502" y="2618660"/>
-            <a:ext cx="1393521" cy="1751398"/>
+            <a:off x="6461103" y="2403262"/>
+            <a:ext cx="1770928" cy="1804788"/>
           </a:xfrm>
           <a:prstGeom prst="bentConnector3">
             <a:avLst>
@@ -5781,8 +5916,8 @@
         </p:nvCxnSpPr>
         <p:spPr>
           <a:xfrm rot="10800000">
-            <a:off x="1423120" y="5332518"/>
-            <a:ext cx="6286629" cy="584983"/>
+            <a:off x="1331642" y="5357298"/>
+            <a:ext cx="6378107" cy="560203"/>
           </a:xfrm>
           <a:prstGeom prst="bentConnector3">
             <a:avLst>
@@ -5822,8 +5957,8 @@
         </p:nvCxnSpPr>
         <p:spPr>
           <a:xfrm rot="10800000" flipV="1">
-            <a:off x="6497563" y="731324"/>
-            <a:ext cx="973268" cy="567937"/>
+            <a:off x="6444173" y="731325"/>
+            <a:ext cx="1026658" cy="942848"/>
           </a:xfrm>
           <a:prstGeom prst="bentConnector2">
             <a:avLst/>
@@ -5858,7 +5993,7 @@
         </p:nvCxnSpPr>
         <p:spPr>
           <a:xfrm rot="5400000" flipH="1" flipV="1">
-            <a:off x="6322327" y="1117183"/>
+            <a:off x="6268937" y="1471886"/>
             <a:ext cx="350474" cy="1"/>
           </a:xfrm>
           <a:prstGeom prst="bentConnector3">
@@ -6041,7 +6176,7 @@
         </p:nvSpPr>
         <p:spPr>
           <a:xfrm>
-            <a:off x="6830373" y="1774567"/>
+            <a:off x="6732240" y="1814516"/>
             <a:ext cx="583814" cy="253916"/>
           </a:xfrm>
           <a:prstGeom prst="rect">

</xml_diff>

<commit_message>
add mozlog (incomplete) ad dockerflow app markup
</commit_message>
<xml_diff>
--- a/docs/Architecture.pptx
+++ b/docs/Architecture.pptx
@@ -192,7 +192,7 @@
           <a:p>
             <a:fld id="{12C73BD1-E919-4514-A897-6086B61B6A01}" type="datetimeFigureOut">
               <a:rPr lang="en-CA" smtClean="0"/>
-              <a:t>2015-08-03</a:t>
+              <a:t>2018-06-04</a:t>
             </a:fld>
             <a:endParaRPr lang="en-CA"/>
           </a:p>
@@ -725,7 +725,7 @@
           <a:p>
             <a:fld id="{57E13E19-9712-4C08-A35C-78B78B9B3BC2}" type="datetimeFigureOut">
               <a:rPr lang="en-CA" smtClean="0"/>
-              <a:t>2015-08-03</a:t>
+              <a:t>2018-06-04</a:t>
             </a:fld>
             <a:endParaRPr lang="en-CA"/>
           </a:p>
@@ -895,7 +895,7 @@
           <a:p>
             <a:fld id="{57E13E19-9712-4C08-A35C-78B78B9B3BC2}" type="datetimeFigureOut">
               <a:rPr lang="en-CA" smtClean="0"/>
-              <a:t>2015-08-03</a:t>
+              <a:t>2018-06-04</a:t>
             </a:fld>
             <a:endParaRPr lang="en-CA"/>
           </a:p>
@@ -1075,7 +1075,7 @@
           <a:p>
             <a:fld id="{57E13E19-9712-4C08-A35C-78B78B9B3BC2}" type="datetimeFigureOut">
               <a:rPr lang="en-CA" smtClean="0"/>
-              <a:t>2015-08-03</a:t>
+              <a:t>2018-06-04</a:t>
             </a:fld>
             <a:endParaRPr lang="en-CA"/>
           </a:p>
@@ -1245,7 +1245,7 @@
           <a:p>
             <a:fld id="{57E13E19-9712-4C08-A35C-78B78B9B3BC2}" type="datetimeFigureOut">
               <a:rPr lang="en-CA" smtClean="0"/>
-              <a:t>2015-08-03</a:t>
+              <a:t>2018-06-04</a:t>
             </a:fld>
             <a:endParaRPr lang="en-CA"/>
           </a:p>
@@ -1491,7 +1491,7 @@
           <a:p>
             <a:fld id="{57E13E19-9712-4C08-A35C-78B78B9B3BC2}" type="datetimeFigureOut">
               <a:rPr lang="en-CA" smtClean="0"/>
-              <a:t>2015-08-03</a:t>
+              <a:t>2018-06-04</a:t>
             </a:fld>
             <a:endParaRPr lang="en-CA"/>
           </a:p>
@@ -1779,7 +1779,7 @@
           <a:p>
             <a:fld id="{57E13E19-9712-4C08-A35C-78B78B9B3BC2}" type="datetimeFigureOut">
               <a:rPr lang="en-CA" smtClean="0"/>
-              <a:t>2015-08-03</a:t>
+              <a:t>2018-06-04</a:t>
             </a:fld>
             <a:endParaRPr lang="en-CA"/>
           </a:p>
@@ -2201,7 +2201,7 @@
           <a:p>
             <a:fld id="{57E13E19-9712-4C08-A35C-78B78B9B3BC2}" type="datetimeFigureOut">
               <a:rPr lang="en-CA" smtClean="0"/>
-              <a:t>2015-08-03</a:t>
+              <a:t>2018-06-04</a:t>
             </a:fld>
             <a:endParaRPr lang="en-CA"/>
           </a:p>
@@ -2319,7 +2319,7 @@
           <a:p>
             <a:fld id="{57E13E19-9712-4C08-A35C-78B78B9B3BC2}" type="datetimeFigureOut">
               <a:rPr lang="en-CA" smtClean="0"/>
-              <a:t>2015-08-03</a:t>
+              <a:t>2018-06-04</a:t>
             </a:fld>
             <a:endParaRPr lang="en-CA"/>
           </a:p>
@@ -2414,7 +2414,7 @@
           <a:p>
             <a:fld id="{57E13E19-9712-4C08-A35C-78B78B9B3BC2}" type="datetimeFigureOut">
               <a:rPr lang="en-CA" smtClean="0"/>
-              <a:t>2015-08-03</a:t>
+              <a:t>2018-06-04</a:t>
             </a:fld>
             <a:endParaRPr lang="en-CA"/>
           </a:p>
@@ -2691,7 +2691,7 @@
           <a:p>
             <a:fld id="{57E13E19-9712-4C08-A35C-78B78B9B3BC2}" type="datetimeFigureOut">
               <a:rPr lang="en-CA" smtClean="0"/>
-              <a:t>2015-08-03</a:t>
+              <a:t>2018-06-04</a:t>
             </a:fld>
             <a:endParaRPr lang="en-CA"/>
           </a:p>
@@ -2944,7 +2944,7 @@
           <a:p>
             <a:fld id="{57E13E19-9712-4C08-A35C-78B78B9B3BC2}" type="datetimeFigureOut">
               <a:rPr lang="en-CA" smtClean="0"/>
-              <a:t>2015-08-03</a:t>
+              <a:t>2018-06-04</a:t>
             </a:fld>
             <a:endParaRPr lang="en-CA"/>
           </a:p>
@@ -3157,7 +3157,7 @@
           <a:p>
             <a:fld id="{57E13E19-9712-4C08-A35C-78B78B9B3BC2}" type="datetimeFigureOut">
               <a:rPr lang="en-CA" smtClean="0"/>
-              <a:t>2015-08-03</a:t>
+              <a:t>2018-06-04</a:t>
             </a:fld>
             <a:endParaRPr lang="en-CA"/>
           </a:p>
@@ -5740,7 +5740,7 @@
         <p:spPr>
           <a:xfrm>
             <a:off x="5335306" y="1503719"/>
-            <a:ext cx="1612958" cy="2348908"/>
+            <a:ext cx="1612958" cy="3148714"/>
           </a:xfrm>
           <a:prstGeom prst="roundRect">
             <a:avLst>
@@ -5784,14 +5784,6 @@
                 </a:solidFill>
               </a:rPr>
               <a:t>Coordinator</a:t>
-            </a:r>
-            <a:r>
-              <a:rPr lang="en-CA" sz="1200" b="1" dirty="0" smtClean="0">
-                <a:solidFill>
-                  <a:schemeClr val="tx1"/>
-                </a:solidFill>
-              </a:rPr>
-              <a:t/>
             </a:r>
             <a:br>
               <a:rPr lang="en-CA" sz="1200" b="1" dirty="0" smtClean="0">
@@ -6239,80 +6231,6 @@
                 <a:schemeClr val="tx1"/>
               </a:solidFill>
             </a:endParaRPr>
-          </a:p>
-        </p:txBody>
-      </p:sp>
-      <p:sp>
-        <p:nvSpPr>
-          <p:cNvPr id="84" name="Rounded Rectangle 83">
-            <a:hlinkClick r:id="rId4"/>
-          </p:cNvPr>
-          <p:cNvSpPr/>
-          <p:nvPr/>
-        </p:nvSpPr>
-        <p:spPr>
-          <a:xfrm>
-            <a:off x="3869184" y="1515210"/>
-            <a:ext cx="1239751" cy="1288895"/>
-          </a:xfrm>
-          <a:prstGeom prst="roundRect">
-            <a:avLst>
-              <a:gd name="adj" fmla="val 0"/>
-            </a:avLst>
-          </a:prstGeom>
-          <a:solidFill>
-            <a:srgbClr val="FCFCFC"/>
-          </a:solidFill>
-          <a:ln>
-            <a:solidFill>
-              <a:srgbClr val="74B73F"/>
-            </a:solidFill>
-          </a:ln>
-        </p:spPr>
-        <p:style>
-          <a:lnRef idx="2">
-            <a:schemeClr val="accent1">
-              <a:shade val="50000"/>
-            </a:schemeClr>
-          </a:lnRef>
-          <a:fillRef idx="1">
-            <a:schemeClr val="accent1"/>
-          </a:fillRef>
-          <a:effectRef idx="0">
-            <a:schemeClr val="accent1"/>
-          </a:effectRef>
-          <a:fontRef idx="minor">
-            <a:schemeClr val="lt1"/>
-          </a:fontRef>
-        </p:style>
-        <p:txBody>
-          <a:bodyPr rtlCol="0" anchor="b" anchorCtr="0"/>
-          <a:lstStyle/>
-          <a:p>
-            <a:pPr algn="ctr"/>
-            <a:r>
-              <a:rPr lang="en-CA" sz="1200" b="1" dirty="0" smtClean="0">
-                <a:solidFill>
-                  <a:schemeClr val="tx1"/>
-                </a:solidFill>
-              </a:rPr>
-              <a:t>Master</a:t>
-            </a:r>
-            <a:br>
-              <a:rPr lang="en-CA" sz="1200" b="1" dirty="0" smtClean="0">
-                <a:solidFill>
-                  <a:schemeClr val="tx1"/>
-                </a:solidFill>
-              </a:rPr>
-            </a:br>
-            <a:r>
-              <a:rPr lang="en-CA" sz="1200" b="1" dirty="0" smtClean="0">
-                <a:solidFill>
-                  <a:schemeClr val="tx1"/>
-                </a:solidFill>
-              </a:rPr>
-              <a:t>(r3.xlarge)</a:t>
-            </a:r>
           </a:p>
         </p:txBody>
       </p:sp>
@@ -6746,36 +6664,411 @@
           </p:spPr>
         </p:pic>
       </p:grpSp>
-      <p:pic>
-        <p:nvPicPr>
-          <p:cNvPr id="73" name="Picture 72"/>
-          <p:cNvPicPr>
-            <a:picLocks noChangeAspect="1"/>
-          </p:cNvPicPr>
+      <p:sp>
+        <p:nvSpPr>
+          <p:cNvPr id="82" name="Rounded Rectangle 81">
+            <a:hlinkClick r:id="rId4"/>
+          </p:cNvPr>
+          <p:cNvSpPr/>
           <p:nvPr/>
-        </p:nvPicPr>
-        <p:blipFill>
-          <a:blip r:embed="rId11" cstate="print">
-            <a:extLst>
-              <a:ext uri="{28A0092B-C50C-407E-A947-70E740481C1C}">
-                <a14:useLocalDpi xmlns:a14="http://schemas.microsoft.com/office/drawing/2010/main" val="0"/>
-              </a:ext>
-            </a:extLst>
-          </a:blip>
-          <a:stretch>
-            <a:fillRect/>
-          </a:stretch>
-        </p:blipFill>
+        </p:nvSpPr>
         <p:spPr>
           <a:xfrm>
-            <a:off x="4113915" y="1629715"/>
-            <a:ext cx="750287" cy="743954"/>
+            <a:off x="3942000" y="1422000"/>
+            <a:ext cx="1239751" cy="1288895"/>
           </a:xfrm>
-          <a:prstGeom prst="rect">
-            <a:avLst/>
+          <a:prstGeom prst="roundRect">
+            <a:avLst>
+              <a:gd name="adj" fmla="val 0"/>
+            </a:avLst>
           </a:prstGeom>
+          <a:solidFill>
+            <a:srgbClr val="FCFCFC"/>
+          </a:solidFill>
+          <a:ln>
+            <a:solidFill>
+              <a:srgbClr val="74B73F"/>
+            </a:solidFill>
+          </a:ln>
         </p:spPr>
-      </p:pic>
+        <p:style>
+          <a:lnRef idx="2">
+            <a:schemeClr val="accent1">
+              <a:shade val="50000"/>
+            </a:schemeClr>
+          </a:lnRef>
+          <a:fillRef idx="1">
+            <a:schemeClr val="accent1"/>
+          </a:fillRef>
+          <a:effectRef idx="0">
+            <a:schemeClr val="accent1"/>
+          </a:effectRef>
+          <a:fontRef idx="minor">
+            <a:schemeClr val="lt1"/>
+          </a:fontRef>
+        </p:style>
+        <p:txBody>
+          <a:bodyPr rtlCol="0" anchor="b" anchorCtr="0"/>
+          <a:lstStyle/>
+          <a:p>
+            <a:pPr algn="ctr"/>
+            <a:r>
+              <a:rPr lang="en-CA" sz="1200" b="1" dirty="0" smtClean="0">
+                <a:solidFill>
+                  <a:schemeClr val="tx1"/>
+                </a:solidFill>
+              </a:rPr>
+              <a:t>Backup</a:t>
+            </a:r>
+            <a:r>
+              <a:rPr lang="en-CA" sz="1200" b="1" dirty="0" smtClean="0">
+                <a:solidFill>
+                  <a:schemeClr val="tx1"/>
+                </a:solidFill>
+              </a:rPr>
+              <a:t/>
+            </a:r>
+            <a:br>
+              <a:rPr lang="en-CA" sz="1200" b="1" dirty="0" smtClean="0">
+                <a:solidFill>
+                  <a:schemeClr val="tx1"/>
+                </a:solidFill>
+              </a:rPr>
+            </a:br>
+            <a:r>
+              <a:rPr lang="en-CA" sz="1200" b="1" dirty="0" smtClean="0">
+                <a:solidFill>
+                  <a:schemeClr val="tx1"/>
+                </a:solidFill>
+              </a:rPr>
+              <a:t>(d2.2xlarge</a:t>
+            </a:r>
+            <a:r>
+              <a:rPr lang="en-CA" sz="1200" b="1" dirty="0" smtClean="0">
+                <a:solidFill>
+                  <a:schemeClr val="tx1"/>
+                </a:solidFill>
+              </a:rPr>
+              <a:t>)</a:t>
+            </a:r>
+          </a:p>
+        </p:txBody>
+      </p:sp>
+      <p:sp>
+        <p:nvSpPr>
+          <p:cNvPr id="85" name="Rounded Rectangle 84">
+            <a:hlinkClick r:id="rId4"/>
+          </p:cNvPr>
+          <p:cNvSpPr/>
+          <p:nvPr/>
+        </p:nvSpPr>
+        <p:spPr>
+          <a:xfrm>
+            <a:off x="3887730" y="1476000"/>
+            <a:ext cx="1239751" cy="1288895"/>
+          </a:xfrm>
+          <a:prstGeom prst="roundRect">
+            <a:avLst>
+              <a:gd name="adj" fmla="val 0"/>
+            </a:avLst>
+          </a:prstGeom>
+          <a:solidFill>
+            <a:srgbClr val="FCFCFC"/>
+          </a:solidFill>
+          <a:ln>
+            <a:solidFill>
+              <a:srgbClr val="74B73F"/>
+            </a:solidFill>
+          </a:ln>
+        </p:spPr>
+        <p:style>
+          <a:lnRef idx="2">
+            <a:schemeClr val="accent1">
+              <a:shade val="50000"/>
+            </a:schemeClr>
+          </a:lnRef>
+          <a:fillRef idx="1">
+            <a:schemeClr val="accent1"/>
+          </a:fillRef>
+          <a:effectRef idx="0">
+            <a:schemeClr val="accent1"/>
+          </a:effectRef>
+          <a:fontRef idx="minor">
+            <a:schemeClr val="lt1"/>
+          </a:fontRef>
+        </p:style>
+        <p:txBody>
+          <a:bodyPr rtlCol="0" anchor="b" anchorCtr="0"/>
+          <a:lstStyle/>
+          <a:p>
+            <a:pPr algn="ctr"/>
+            <a:r>
+              <a:rPr lang="en-CA" sz="1200" b="1" dirty="0" smtClean="0">
+                <a:solidFill>
+                  <a:schemeClr val="tx1"/>
+                </a:solidFill>
+              </a:rPr>
+              <a:t>Backup</a:t>
+            </a:r>
+            <a:r>
+              <a:rPr lang="en-CA" sz="1200" b="1" dirty="0" smtClean="0">
+                <a:solidFill>
+                  <a:schemeClr val="tx1"/>
+                </a:solidFill>
+              </a:rPr>
+              <a:t/>
+            </a:r>
+            <a:br>
+              <a:rPr lang="en-CA" sz="1200" b="1" dirty="0" smtClean="0">
+                <a:solidFill>
+                  <a:schemeClr val="tx1"/>
+                </a:solidFill>
+              </a:rPr>
+            </a:br>
+            <a:r>
+              <a:rPr lang="en-CA" sz="1200" b="1" dirty="0" smtClean="0">
+                <a:solidFill>
+                  <a:schemeClr val="tx1"/>
+                </a:solidFill>
+              </a:rPr>
+              <a:t>(d2.2xlarge</a:t>
+            </a:r>
+            <a:r>
+              <a:rPr lang="en-CA" sz="1200" b="1" dirty="0" smtClean="0">
+                <a:solidFill>
+                  <a:schemeClr val="tx1"/>
+                </a:solidFill>
+              </a:rPr>
+              <a:t>)</a:t>
+            </a:r>
+          </a:p>
+        </p:txBody>
+      </p:sp>
+      <p:sp>
+        <p:nvSpPr>
+          <p:cNvPr id="86" name="Rounded Rectangle 85">
+            <a:hlinkClick r:id="rId4"/>
+          </p:cNvPr>
+          <p:cNvSpPr/>
+          <p:nvPr/>
+        </p:nvSpPr>
+        <p:spPr>
+          <a:xfrm>
+            <a:off x="3834000" y="1530000"/>
+            <a:ext cx="1239751" cy="1288895"/>
+          </a:xfrm>
+          <a:prstGeom prst="roundRect">
+            <a:avLst>
+              <a:gd name="adj" fmla="val 0"/>
+            </a:avLst>
+          </a:prstGeom>
+          <a:solidFill>
+            <a:srgbClr val="FCFCFC"/>
+          </a:solidFill>
+          <a:ln>
+            <a:solidFill>
+              <a:srgbClr val="74B73F"/>
+            </a:solidFill>
+          </a:ln>
+        </p:spPr>
+        <p:style>
+          <a:lnRef idx="2">
+            <a:schemeClr val="accent1">
+              <a:shade val="50000"/>
+            </a:schemeClr>
+          </a:lnRef>
+          <a:fillRef idx="1">
+            <a:schemeClr val="accent1"/>
+          </a:fillRef>
+          <a:effectRef idx="0">
+            <a:schemeClr val="accent1"/>
+          </a:effectRef>
+          <a:fontRef idx="minor">
+            <a:schemeClr val="lt1"/>
+          </a:fontRef>
+        </p:style>
+        <p:txBody>
+          <a:bodyPr rtlCol="0" anchor="b" anchorCtr="0"/>
+          <a:lstStyle/>
+          <a:p>
+            <a:pPr algn="ctr"/>
+            <a:r>
+              <a:rPr lang="en-CA" sz="1200" b="1" dirty="0" smtClean="0">
+                <a:solidFill>
+                  <a:schemeClr val="tx1"/>
+                </a:solidFill>
+              </a:rPr>
+              <a:t>Backup</a:t>
+            </a:r>
+            <a:r>
+              <a:rPr lang="en-CA" sz="1200" b="1" dirty="0" smtClean="0">
+                <a:solidFill>
+                  <a:schemeClr val="tx1"/>
+                </a:solidFill>
+              </a:rPr>
+              <a:t/>
+            </a:r>
+            <a:br>
+              <a:rPr lang="en-CA" sz="1200" b="1" dirty="0" smtClean="0">
+                <a:solidFill>
+                  <a:schemeClr val="tx1"/>
+                </a:solidFill>
+              </a:rPr>
+            </a:br>
+            <a:r>
+              <a:rPr lang="en-CA" sz="1200" b="1" dirty="0" smtClean="0">
+                <a:solidFill>
+                  <a:schemeClr val="tx1"/>
+                </a:solidFill>
+              </a:rPr>
+              <a:t>(d2.2xlarge</a:t>
+            </a:r>
+            <a:r>
+              <a:rPr lang="en-CA" sz="1200" b="1" dirty="0" smtClean="0">
+                <a:solidFill>
+                  <a:schemeClr val="tx1"/>
+                </a:solidFill>
+              </a:rPr>
+              <a:t>)</a:t>
+            </a:r>
+          </a:p>
+        </p:txBody>
+      </p:sp>
+      <p:grpSp>
+        <p:nvGrpSpPr>
+          <p:cNvPr id="3" name="Group 2"/>
+          <p:cNvGrpSpPr/>
+          <p:nvPr/>
+        </p:nvGrpSpPr>
+        <p:grpSpPr>
+          <a:xfrm>
+            <a:off x="3779910" y="1582832"/>
+            <a:ext cx="1239751" cy="1288895"/>
+            <a:chOff x="2918266" y="1289613"/>
+            <a:chExt cx="1239751" cy="1288895"/>
+          </a:xfrm>
+        </p:grpSpPr>
+        <p:sp>
+          <p:nvSpPr>
+            <p:cNvPr id="84" name="Rounded Rectangle 83">
+              <a:hlinkClick r:id="rId4"/>
+            </p:cNvPr>
+            <p:cNvSpPr/>
+            <p:nvPr/>
+          </p:nvSpPr>
+          <p:spPr>
+            <a:xfrm>
+              <a:off x="2918266" y="1289613"/>
+              <a:ext cx="1239751" cy="1288895"/>
+            </a:xfrm>
+            <a:prstGeom prst="roundRect">
+              <a:avLst>
+                <a:gd name="adj" fmla="val 0"/>
+              </a:avLst>
+            </a:prstGeom>
+            <a:solidFill>
+              <a:srgbClr val="FCFCFC"/>
+            </a:solidFill>
+            <a:ln>
+              <a:solidFill>
+                <a:srgbClr val="74B73F"/>
+              </a:solidFill>
+            </a:ln>
+          </p:spPr>
+          <p:style>
+            <a:lnRef idx="2">
+              <a:schemeClr val="accent1">
+                <a:shade val="50000"/>
+              </a:schemeClr>
+            </a:lnRef>
+            <a:fillRef idx="1">
+              <a:schemeClr val="accent1"/>
+            </a:fillRef>
+            <a:effectRef idx="0">
+              <a:schemeClr val="accent1"/>
+            </a:effectRef>
+            <a:fontRef idx="minor">
+              <a:schemeClr val="lt1"/>
+            </a:fontRef>
+          </p:style>
+          <p:txBody>
+            <a:bodyPr rtlCol="0" anchor="b" anchorCtr="0"/>
+            <a:lstStyle/>
+            <a:p>
+              <a:pPr algn="ctr"/>
+              <a:r>
+                <a:rPr lang="en-CA" sz="1200" b="1" dirty="0" smtClean="0">
+                  <a:solidFill>
+                    <a:schemeClr val="tx1"/>
+                  </a:solidFill>
+                </a:rPr>
+                <a:t>Backup</a:t>
+              </a:r>
+              <a:r>
+                <a:rPr lang="en-CA" sz="1200" b="1" dirty="0" smtClean="0">
+                  <a:solidFill>
+                    <a:schemeClr val="tx1"/>
+                  </a:solidFill>
+                </a:rPr>
+                <a:t/>
+              </a:r>
+              <a:br>
+                <a:rPr lang="en-CA" sz="1200" b="1" dirty="0" smtClean="0">
+                  <a:solidFill>
+                    <a:schemeClr val="tx1"/>
+                  </a:solidFill>
+                </a:rPr>
+              </a:br>
+              <a:r>
+                <a:rPr lang="en-CA" sz="1200" b="1" dirty="0" smtClean="0">
+                  <a:solidFill>
+                    <a:schemeClr val="tx1"/>
+                  </a:solidFill>
+                </a:rPr>
+                <a:t>(d2.2xlarge</a:t>
+              </a:r>
+              <a:r>
+                <a:rPr lang="en-CA" sz="1200" b="1" dirty="0" smtClean="0">
+                  <a:solidFill>
+                    <a:schemeClr val="tx1"/>
+                  </a:solidFill>
+                </a:rPr>
+                <a:t>)</a:t>
+              </a:r>
+            </a:p>
+          </p:txBody>
+        </p:sp>
+        <p:pic>
+          <p:nvPicPr>
+            <p:cNvPr id="73" name="Picture 72"/>
+            <p:cNvPicPr>
+              <a:picLocks noChangeAspect="1"/>
+            </p:cNvPicPr>
+            <p:nvPr/>
+          </p:nvPicPr>
+          <p:blipFill>
+            <a:blip r:embed="rId11" cstate="print">
+              <a:extLst>
+                <a:ext uri="{28A0092B-C50C-407E-A947-70E740481C1C}">
+                  <a14:useLocalDpi xmlns:a14="http://schemas.microsoft.com/office/drawing/2010/main" val="0"/>
+                </a:ext>
+              </a:extLst>
+            </a:blip>
+            <a:stretch>
+              <a:fillRect/>
+            </a:stretch>
+          </p:blipFill>
+          <p:spPr>
+            <a:xfrm>
+              <a:off x="3162997" y="1399174"/>
+              <a:ext cx="750287" cy="743954"/>
+            </a:xfrm>
+            <a:prstGeom prst="rect">
+              <a:avLst/>
+            </a:prstGeom>
+          </p:spPr>
+        </p:pic>
+      </p:grpSp>
     </p:spTree>
     <p:extLst>
       <p:ext uri="{BB962C8B-B14F-4D97-AF65-F5344CB8AC3E}">

</xml_diff>